<commit_message>
Slides Verwerfung: Bitte drueberschauen
</commit_message>
<xml_diff>
--- a/slides/BSP 12 URLAUB.pptx
+++ b/slides/BSP 12 URLAUB.pptx
@@ -108,6 +108,11 @@
       </a:defRPr>
     </a:lvl9pPr>
   </p:defaultTextStyle>
+  <p:extLst>
+    <p:ext uri="{EFAFB233-063F-42B5-8137-9DF3F51BA10A}">
+      <p15:sldGuideLst xmlns:p15="http://schemas.microsoft.com/office/powerpoint/2012/main"/>
+    </p:ext>
+  </p:extLst>
 </p:presentation>
 </file>
 
@@ -3274,7 +3279,7 @@
           <a:p>
             <a:r>
               <a:rPr lang="de-AT" dirty="0"/>
-              <a:t>Aufgabe a Simulation von 10 Jahren</a:t>
+              <a:t>Aufgabe a - Simulation von 10 Jahren</a:t>
             </a:r>
           </a:p>
         </p:txBody>
@@ -3292,7 +3297,7 @@
         <p:spPr/>
         <p:txBody>
           <a:bodyPr>
-            <a:normAutofit fontScale="85000" lnSpcReduction="10000"/>
+            <a:normAutofit fontScale="85000" lnSpcReduction="20000"/>
           </a:bodyPr>
           <a:lstStyle/>
           <a:p>
@@ -3391,7 +3396,15 @@
             </a:br>
             <a:r>
               <a:rPr lang="de-AT" dirty="0"/>
-              <a:t>und verknüpfen Sie mit der Wahrscheinlichkeit für Ihren Aufenthalt in einem Land im Folgejahr.</a:t>
+              <a:t>und verknüpfen sie mit der Wahrscheinlichkeit für ihren Aufenthalt in einem Land im Folgejahr (</a:t>
+            </a:r>
+            <a:r>
+              <a:rPr lang="de-AT" dirty="0" err="1"/>
+              <a:t>Ümatrix</a:t>
+            </a:r>
+            <a:r>
+              <a:rPr lang="de-AT" dirty="0"/>
+              <a:t> + LPF).</a:t>
             </a:r>
             <a:br>
               <a:rPr lang="de-AT" dirty="0"/>
@@ -3414,23 +3427,70 @@
             </a:r>
             <a:r>
               <a:rPr lang="de-AT" dirty="0"/>
-              <a:t> und der Übergangsmatrix bestimmt und dann mit der Zahl der Reisenden verknüpft </a:t>
+              <a:t> (gibt einen Index zurück der mit einer </a:t>
+            </a:r>
+            <a:r>
+              <a:rPr lang="de-AT" dirty="0" err="1"/>
+              <a:t>probability</a:t>
+            </a:r>
+            <a:r>
+              <a:rPr lang="de-AT" dirty="0"/>
+              <a:t> </a:t>
+            </a:r>
+            <a:r>
+              <a:rPr lang="de-AT" dirty="0" err="1"/>
+              <a:t>list</a:t>
+            </a:r>
+            <a:r>
+              <a:rPr lang="de-AT" dirty="0"/>
+              <a:t> (hier </a:t>
+            </a:r>
+            <a:r>
+              <a:rPr lang="de-AT" dirty="0" err="1"/>
+              <a:t>row</a:t>
+            </a:r>
+            <a:r>
+              <a:rPr lang="de-AT" dirty="0"/>
+              <a:t> der </a:t>
+            </a:r>
+            <a:r>
+              <a:rPr lang="de-AT" dirty="0" err="1"/>
+              <a:t>Ümatrix</a:t>
+            </a:r>
+            <a:r>
+              <a:rPr lang="de-AT" dirty="0"/>
+              <a:t>) bestimmt </a:t>
             </a:r>
             <a:r>
               <a:rPr lang="de-AT" dirty="0">
                 <a:sym typeface="Wingdings" panose="05000000000000000000" pitchFamily="2" charset="2"/>
               </a:rPr>
-              <a:t> dies ergibt den New </a:t>
+              <a:t> diese weißt einen Index (</a:t>
             </a:r>
             <a:r>
               <a:rPr lang="de-AT" dirty="0" err="1">
                 <a:sym typeface="Wingdings" panose="05000000000000000000" pitchFamily="2" charset="2"/>
               </a:rPr>
-              <a:t>Vector</a:t>
-            </a:r>
-            <a:endParaRPr lang="de-AT" dirty="0">
-              <a:sym typeface="Wingdings" panose="05000000000000000000" pitchFamily="2" charset="2"/>
-            </a:endParaRPr>
+              <a:t>country</a:t>
+            </a:r>
+            <a:r>
+              <a:rPr lang="de-AT" dirty="0">
+                <a:sym typeface="Wingdings" panose="05000000000000000000" pitchFamily="2" charset="2"/>
+              </a:rPr>
+              <a:t>) an dem sich der </a:t>
+            </a:r>
+            <a:r>
+              <a:rPr lang="de-AT" dirty="0" err="1">
+                <a:sym typeface="Wingdings" panose="05000000000000000000" pitchFamily="2" charset="2"/>
+              </a:rPr>
+              <a:t>Traveller</a:t>
+            </a:r>
+            <a:r>
+              <a:rPr lang="de-AT" dirty="0">
+                <a:sym typeface="Wingdings" panose="05000000000000000000" pitchFamily="2" charset="2"/>
+              </a:rPr>
+              <a:t> im nächsten Jahr befindet zu.</a:t>
+            </a:r>
           </a:p>
           <a:p>
             <a:pPr marL="514350" indent="-514350">
@@ -3566,10 +3626,16 @@
               <a:t>difference</a:t>
             </a:r>
             <a:r>
-              <a:rPr lang="de-AT">
+              <a:rPr lang="de-AT" dirty="0">
                 <a:sym typeface="Wingdings" panose="05000000000000000000" pitchFamily="2" charset="2"/>
               </a:rPr>
-              <a:t> vector</a:t>
+              <a:t> </a:t>
+            </a:r>
+            <a:r>
+              <a:rPr lang="de-AT" dirty="0" err="1">
+                <a:sym typeface="Wingdings" panose="05000000000000000000" pitchFamily="2" charset="2"/>
+              </a:rPr>
+              <a:t>vector</a:t>
             </a:r>
             <a:r>
               <a:rPr lang="de-AT" dirty="0">
@@ -3658,7 +3724,7 @@
           <a:p>
             <a:r>
               <a:rPr lang="de-AT" dirty="0"/>
-              <a:t>Aufgabe b Theoretische Verteilung (WK)</a:t>
+              <a:t>Aufgabe b - Theoretische Verteilung (WK)</a:t>
             </a:r>
           </a:p>
         </p:txBody>
@@ -3700,7 +3766,7 @@
             </a:pPr>
             <a:r>
               <a:rPr lang="de-AT" dirty="0"/>
-              <a:t>Wiederum wiederholt man diese Matrixmultiplikation (4x4)*(4x1) 10 Mal.</a:t>
+              <a:t>Man wiederholt diese Matrixmultiplikation (4x4)*(4x1) 10 Mal.</a:t>
             </a:r>
           </a:p>
         </p:txBody>

</xml_diff>